<commit_message>
update presentation, add notes, push rf code update
</commit_message>
<xml_diff>
--- a/ufc.pptx
+++ b/ufc.pptx
@@ -212,7 +212,7 @@
           <a:p>
             <a:fld id="{D486035D-20A4-0D44-9361-E2F29387BE10}" type="datetimeFigureOut">
               <a:rPr lang="en-US" smtClean="0"/>
-              <a:t>4/24/2021</a:t>
+              <a:t>4/25/2021</a:t>
             </a:fld>
             <a:endParaRPr lang="en-US"/>
           </a:p>
@@ -2346,7 +2346,7 @@
           <a:p>
             <a:fld id="{606BA9FF-F087-5E4E-8AD9-D0111DCFFBDD}" type="datetimeFigureOut">
               <a:rPr lang="en-US" smtClean="0"/>
-              <a:t>4/24/2021</a:t>
+              <a:t>4/25/2021</a:t>
             </a:fld>
             <a:endParaRPr lang="en-US"/>
           </a:p>
@@ -2544,7 +2544,7 @@
           <a:p>
             <a:fld id="{606BA9FF-F087-5E4E-8AD9-D0111DCFFBDD}" type="datetimeFigureOut">
               <a:rPr lang="en-US" smtClean="0"/>
-              <a:t>4/24/2021</a:t>
+              <a:t>4/25/2021</a:t>
             </a:fld>
             <a:endParaRPr lang="en-US"/>
           </a:p>
@@ -2752,7 +2752,7 @@
           <a:p>
             <a:fld id="{606BA9FF-F087-5E4E-8AD9-D0111DCFFBDD}" type="datetimeFigureOut">
               <a:rPr lang="en-US" smtClean="0"/>
-              <a:t>4/24/2021</a:t>
+              <a:t>4/25/2021</a:t>
             </a:fld>
             <a:endParaRPr lang="en-US"/>
           </a:p>
@@ -2950,7 +2950,7 @@
           <a:p>
             <a:fld id="{606BA9FF-F087-5E4E-8AD9-D0111DCFFBDD}" type="datetimeFigureOut">
               <a:rPr lang="en-US" smtClean="0"/>
-              <a:t>4/24/2021</a:t>
+              <a:t>4/25/2021</a:t>
             </a:fld>
             <a:endParaRPr lang="en-US"/>
           </a:p>
@@ -3225,7 +3225,7 @@
           <a:p>
             <a:fld id="{606BA9FF-F087-5E4E-8AD9-D0111DCFFBDD}" type="datetimeFigureOut">
               <a:rPr lang="en-US" smtClean="0"/>
-              <a:t>4/24/2021</a:t>
+              <a:t>4/25/2021</a:t>
             </a:fld>
             <a:endParaRPr lang="en-US"/>
           </a:p>
@@ -3490,7 +3490,7 @@
           <a:p>
             <a:fld id="{606BA9FF-F087-5E4E-8AD9-D0111DCFFBDD}" type="datetimeFigureOut">
               <a:rPr lang="en-US" smtClean="0"/>
-              <a:t>4/24/2021</a:t>
+              <a:t>4/25/2021</a:t>
             </a:fld>
             <a:endParaRPr lang="en-US"/>
           </a:p>
@@ -3902,7 +3902,7 @@
           <a:p>
             <a:fld id="{606BA9FF-F087-5E4E-8AD9-D0111DCFFBDD}" type="datetimeFigureOut">
               <a:rPr lang="en-US" smtClean="0"/>
-              <a:t>4/24/2021</a:t>
+              <a:t>4/25/2021</a:t>
             </a:fld>
             <a:endParaRPr lang="en-US"/>
           </a:p>
@@ -4043,7 +4043,7 @@
           <a:p>
             <a:fld id="{606BA9FF-F087-5E4E-8AD9-D0111DCFFBDD}" type="datetimeFigureOut">
               <a:rPr lang="en-US" smtClean="0"/>
-              <a:t>4/24/2021</a:t>
+              <a:t>4/25/2021</a:t>
             </a:fld>
             <a:endParaRPr lang="en-US"/>
           </a:p>
@@ -4156,7 +4156,7 @@
           <a:p>
             <a:fld id="{606BA9FF-F087-5E4E-8AD9-D0111DCFFBDD}" type="datetimeFigureOut">
               <a:rPr lang="en-US" smtClean="0"/>
-              <a:t>4/24/2021</a:t>
+              <a:t>4/25/2021</a:t>
             </a:fld>
             <a:endParaRPr lang="en-US"/>
           </a:p>
@@ -4467,7 +4467,7 @@
           <a:p>
             <a:fld id="{606BA9FF-F087-5E4E-8AD9-D0111DCFFBDD}" type="datetimeFigureOut">
               <a:rPr lang="en-US" smtClean="0"/>
-              <a:t>4/24/2021</a:t>
+              <a:t>4/25/2021</a:t>
             </a:fld>
             <a:endParaRPr lang="en-US"/>
           </a:p>
@@ -4755,7 +4755,7 @@
           <a:p>
             <a:fld id="{606BA9FF-F087-5E4E-8AD9-D0111DCFFBDD}" type="datetimeFigureOut">
               <a:rPr lang="en-US" smtClean="0"/>
-              <a:t>4/24/2021</a:t>
+              <a:t>4/25/2021</a:t>
             </a:fld>
             <a:endParaRPr lang="en-US"/>
           </a:p>
@@ -4996,7 +4996,7 @@
           <a:p>
             <a:fld id="{606BA9FF-F087-5E4E-8AD9-D0111DCFFBDD}" type="datetimeFigureOut">
               <a:rPr lang="en-US" smtClean="0"/>
-              <a:t>4/24/2021</a:t>
+              <a:t>4/25/2021</a:t>
             </a:fld>
             <a:endParaRPr lang="en-US"/>
           </a:p>
@@ -6645,11 +6645,6 @@
                         </a:rPr>
                         <a:t>Reach - R</a:t>
                       </a:r>
-                      <a:endParaRPr lang="en-US" sz="1400" dirty="0" smtClean="0">
-                        <a:solidFill>
-                          <a:schemeClr val="bg1"/>
-                        </a:solidFill>
-                      </a:endParaRPr>
                     </a:p>
                   </a:txBody>
                   <a:tcPr/>
@@ -6785,15 +6780,7 @@
                             <a:schemeClr val="bg1"/>
                           </a:solidFill>
                         </a:rPr>
-                        <a:t>Average Takedowns Landed – </a:t>
-                      </a:r>
-                      <a:r>
-                        <a:rPr lang="en-US" sz="1400" dirty="0" smtClean="0">
-                          <a:solidFill>
-                            <a:schemeClr val="bg1"/>
-                          </a:solidFill>
-                        </a:rPr>
-                        <a:t>B</a:t>
+                        <a:t>Average Takedowns Landed – B</a:t>
                       </a:r>
                       <a:endParaRPr lang="en-US" sz="1400" dirty="0">
                         <a:solidFill>
@@ -7084,11 +7071,6 @@
                         </a:rPr>
                         <a:t>Pass – R</a:t>
                       </a:r>
-                      <a:endParaRPr lang="en-US" sz="1200" dirty="0" smtClean="0">
-                        <a:solidFill>
-                          <a:schemeClr val="bg1"/>
-                        </a:solidFill>
-                      </a:endParaRPr>
                     </a:p>
                   </a:txBody>
                   <a:tcPr/>
@@ -7112,23 +7094,7 @@
                             <a:schemeClr val="bg1"/>
                           </a:solidFill>
                         </a:rPr>
-                        <a:t>Percentage </a:t>
-                      </a:r>
-                      <a:r>
-                        <a:rPr lang="en-US" sz="1200" baseline="0" dirty="0" smtClean="0">
-                          <a:solidFill>
-                            <a:schemeClr val="bg1"/>
-                          </a:solidFill>
-                        </a:rPr>
-                        <a:t>– </a:t>
-                      </a:r>
-                      <a:r>
-                        <a:rPr lang="en-US" sz="1200" baseline="0" dirty="0" smtClean="0">
-                          <a:solidFill>
-                            <a:schemeClr val="bg1"/>
-                          </a:solidFill>
-                        </a:rPr>
-                        <a:t>B </a:t>
+                        <a:t>Percentage – B </a:t>
                       </a:r>
                       <a:endParaRPr lang="en-US" sz="1200" dirty="0">
                         <a:solidFill>
@@ -7198,11 +7164,6 @@
                         </a:rPr>
                         <a:t>Pass – B</a:t>
                       </a:r>
-                      <a:endParaRPr lang="en-US" sz="1200" dirty="0" smtClean="0">
-                        <a:solidFill>
-                          <a:schemeClr val="bg1"/>
-                        </a:solidFill>
-                      </a:endParaRPr>
                     </a:p>
                   </a:txBody>
                   <a:tcPr/>
@@ -7243,23 +7204,7 @@
                             <a:schemeClr val="bg1"/>
                           </a:solidFill>
                         </a:rPr>
-                        <a:t> Percentage </a:t>
-                      </a:r>
-                      <a:r>
-                        <a:rPr lang="en-US" sz="1200" baseline="0" dirty="0" smtClean="0">
-                          <a:solidFill>
-                            <a:schemeClr val="bg1"/>
-                          </a:solidFill>
-                        </a:rPr>
-                        <a:t>– </a:t>
-                      </a:r>
-                      <a:r>
-                        <a:rPr lang="en-US" sz="1200" baseline="0" dirty="0" smtClean="0">
-                          <a:solidFill>
-                            <a:schemeClr val="bg1"/>
-                          </a:solidFill>
-                        </a:rPr>
-                        <a:t>R </a:t>
+                        <a:t> Percentage – R </a:t>
                       </a:r>
                       <a:endParaRPr lang="en-US" sz="1200" dirty="0" smtClean="0">
                         <a:solidFill>
@@ -7296,15 +7241,7 @@
                             <a:schemeClr val="bg1"/>
                           </a:solidFill>
                         </a:rPr>
-                        <a:t> </a:t>
-                      </a:r>
-                      <a:r>
-                        <a:rPr lang="en-US" sz="1200" baseline="0" dirty="0" smtClean="0">
-                          <a:solidFill>
-                            <a:schemeClr val="bg1"/>
-                          </a:solidFill>
-                        </a:rPr>
-                        <a:t>– R</a:t>
+                        <a:t> – R</a:t>
                       </a:r>
                       <a:endParaRPr lang="en-US" sz="1200" dirty="0">
                         <a:solidFill>
@@ -7418,15 +7355,7 @@
                             <a:schemeClr val="bg1"/>
                           </a:solidFill>
                         </a:rPr>
-                        <a:t> </a:t>
-                      </a:r>
-                      <a:r>
-                        <a:rPr lang="en-US" sz="1200" dirty="0" smtClean="0">
-                          <a:solidFill>
-                            <a:schemeClr val="bg1"/>
-                          </a:solidFill>
-                        </a:rPr>
-                        <a:t>– B</a:t>
+                        <a:t> – B</a:t>
                       </a:r>
                     </a:p>
                   </a:txBody>
@@ -7655,15 +7584,7 @@
                             <a:schemeClr val="bg1"/>
                           </a:solidFill>
                         </a:rPr>
-                        <a:t>Attempted </a:t>
-                      </a:r>
-                      <a:r>
-                        <a:rPr lang="en-US" sz="1200" baseline="0" dirty="0" smtClean="0">
-                          <a:solidFill>
-                            <a:schemeClr val="bg1"/>
-                          </a:solidFill>
-                        </a:rPr>
-                        <a:t>– R </a:t>
+                        <a:t>Attempted – R </a:t>
                       </a:r>
                       <a:endParaRPr lang="en-US" sz="1200" dirty="0">
                         <a:solidFill>
@@ -7722,15 +7643,7 @@
                             <a:schemeClr val="bg1"/>
                           </a:solidFill>
                         </a:rPr>
-                        <a:t>Landed </a:t>
-                      </a:r>
-                      <a:r>
-                        <a:rPr lang="en-US" sz="1200" baseline="0" dirty="0" smtClean="0">
-                          <a:solidFill>
-                            <a:schemeClr val="bg1"/>
-                          </a:solidFill>
-                        </a:rPr>
-                        <a:t>– R </a:t>
+                        <a:t>Landed – R </a:t>
                       </a:r>
                       <a:endParaRPr lang="en-US" sz="1200" dirty="0">
                         <a:solidFill>
@@ -7777,23 +7690,7 @@
                             <a:schemeClr val="bg1"/>
                           </a:solidFill>
                         </a:rPr>
-                        <a:t> </a:t>
-                      </a:r>
-                      <a:r>
-                        <a:rPr lang="en-US" sz="1200" baseline="0" dirty="0" smtClean="0">
-                          <a:solidFill>
-                            <a:schemeClr val="bg1"/>
-                          </a:solidFill>
-                        </a:rPr>
-                        <a:t>Attempted </a:t>
-                      </a:r>
-                      <a:r>
-                        <a:rPr lang="en-US" sz="1200" baseline="0" dirty="0" smtClean="0">
-                          <a:solidFill>
-                            <a:schemeClr val="bg1"/>
-                          </a:solidFill>
-                        </a:rPr>
-                        <a:t>– B </a:t>
+                        <a:t> Attempted – B </a:t>
                       </a:r>
                       <a:endParaRPr lang="en-US" sz="1200" dirty="0" smtClean="0">
                         <a:solidFill>
@@ -7869,23 +7766,7 @@
                             <a:schemeClr val="bg1"/>
                           </a:solidFill>
                         </a:rPr>
-                        <a:t> </a:t>
-                      </a:r>
-                      <a:r>
-                        <a:rPr lang="en-US" sz="1200" baseline="0" dirty="0" smtClean="0">
-                          <a:solidFill>
-                            <a:schemeClr val="bg1"/>
-                          </a:solidFill>
-                        </a:rPr>
-                        <a:t>Landed </a:t>
-                      </a:r>
-                      <a:r>
-                        <a:rPr lang="en-US" sz="1200" baseline="0" dirty="0" smtClean="0">
-                          <a:solidFill>
-                            <a:schemeClr val="bg1"/>
-                          </a:solidFill>
-                        </a:rPr>
-                        <a:t>– B </a:t>
+                        <a:t> Landed – B </a:t>
                       </a:r>
                       <a:endParaRPr lang="en-US" sz="1200" dirty="0" smtClean="0">
                         <a:solidFill>
@@ -7907,23 +7788,7 @@
                             <a:schemeClr val="bg1"/>
                           </a:solidFill>
                         </a:rPr>
-                        <a:t>Average Significant Strikes </a:t>
-                      </a:r>
-                      <a:r>
-                        <a:rPr lang="en-US" sz="1200" dirty="0" smtClean="0">
-                          <a:solidFill>
-                            <a:schemeClr val="bg1"/>
-                          </a:solidFill>
-                        </a:rPr>
-                        <a:t>Percentage </a:t>
-                      </a:r>
-                      <a:r>
-                        <a:rPr lang="en-US" sz="1200" dirty="0" smtClean="0">
-                          <a:solidFill>
-                            <a:schemeClr val="bg1"/>
-                          </a:solidFill>
-                        </a:rPr>
-                        <a:t>– R </a:t>
+                        <a:t>Average Significant Strikes Percentage – R </a:t>
                       </a:r>
                       <a:endParaRPr lang="en-US" sz="1200" dirty="0">
                         <a:solidFill>
@@ -7980,15 +7845,7 @@
                             <a:schemeClr val="bg1"/>
                           </a:solidFill>
                         </a:rPr>
-                        <a:t>Significant </a:t>
-                      </a:r>
-                      <a:r>
-                        <a:rPr lang="en-US" sz="1200" dirty="0" smtClean="0">
-                          <a:solidFill>
-                            <a:schemeClr val="bg1"/>
-                          </a:solidFill>
-                        </a:rPr>
-                        <a:t>Strikes </a:t>
+                        <a:t>Significant Strikes </a:t>
                       </a:r>
                       <a:r>
                         <a:rPr lang="en-US" sz="1200" baseline="0" dirty="0" smtClean="0">
@@ -7996,15 +7853,7 @@
                             <a:schemeClr val="bg1"/>
                           </a:solidFill>
                         </a:rPr>
-                        <a:t>Percentage </a:t>
-                      </a:r>
-                      <a:r>
-                        <a:rPr lang="en-US" sz="1200" baseline="0" dirty="0" smtClean="0">
-                          <a:solidFill>
-                            <a:schemeClr val="bg1"/>
-                          </a:solidFill>
-                        </a:rPr>
-                        <a:t>– R </a:t>
+                        <a:t>Percentage – R </a:t>
                       </a:r>
                       <a:endParaRPr lang="en-US" sz="1200" dirty="0">
                         <a:solidFill>
@@ -8026,23 +7875,7 @@
                             <a:schemeClr val="bg1"/>
                           </a:solidFill>
                         </a:rPr>
-                        <a:t>Average Significant Strikes </a:t>
-                      </a:r>
-                      <a:r>
-                        <a:rPr lang="en-US" sz="1200" dirty="0" smtClean="0">
-                          <a:solidFill>
-                            <a:schemeClr val="bg1"/>
-                          </a:solidFill>
-                        </a:rPr>
-                        <a:t>Percentage </a:t>
-                      </a:r>
-                      <a:r>
-                        <a:rPr lang="en-US" sz="1200" dirty="0" smtClean="0">
-                          <a:solidFill>
-                            <a:schemeClr val="bg1"/>
-                          </a:solidFill>
-                        </a:rPr>
-                        <a:t>– B </a:t>
+                        <a:t>Average Significant Strikes Percentage – B </a:t>
                       </a:r>
                       <a:endParaRPr lang="en-US" sz="1200" dirty="0">
                         <a:solidFill>
@@ -8118,15 +7951,7 @@
                             <a:schemeClr val="bg1"/>
                           </a:solidFill>
                         </a:rPr>
-                        <a:t>Percentage – </a:t>
-                      </a:r>
-                      <a:r>
-                        <a:rPr lang="en-US" sz="1200" baseline="0" dirty="0" smtClean="0">
-                          <a:solidFill>
-                            <a:schemeClr val="bg1"/>
-                          </a:solidFill>
-                        </a:rPr>
-                        <a:t>B </a:t>
+                        <a:t>Percentage – B </a:t>
                       </a:r>
                       <a:endParaRPr lang="en-US" sz="1200" dirty="0" smtClean="0">
                         <a:solidFill>
@@ -8178,23 +8003,7 @@
                             <a:schemeClr val="bg1"/>
                           </a:solidFill>
                         </a:rPr>
-                        <a:t>Age </a:t>
-                      </a:r>
-                      <a:r>
-                        <a:rPr lang="en-US" sz="1200" dirty="0" smtClean="0">
-                          <a:solidFill>
-                            <a:schemeClr val="bg1"/>
-                          </a:solidFill>
-                        </a:rPr>
-                        <a:t>– </a:t>
-                      </a:r>
-                      <a:r>
-                        <a:rPr lang="en-US" sz="1200" dirty="0" smtClean="0">
-                          <a:solidFill>
-                            <a:schemeClr val="bg1"/>
-                          </a:solidFill>
-                        </a:rPr>
-                        <a:t>B</a:t>
+                        <a:t>Age – B</a:t>
                       </a:r>
                       <a:endParaRPr lang="en-US" sz="1200" dirty="0">
                         <a:solidFill>
@@ -8242,11 +8051,6 @@
                         </a:rPr>
                         <a:t>Takedowns Landed – B</a:t>
                       </a:r>
-                      <a:endParaRPr lang="en-US" sz="1200" dirty="0" smtClean="0">
-                        <a:solidFill>
-                          <a:schemeClr val="bg1"/>
-                        </a:solidFill>
-                      </a:endParaRPr>
                     </a:p>
                   </a:txBody>
                   <a:tcPr/>
@@ -8332,11 +8136,6 @@
                         </a:rPr>
                         <a:t>Significant Strikes Attempted – R</a:t>
                       </a:r>
-                      <a:endParaRPr lang="en-US" sz="1200" dirty="0" smtClean="0">
-                        <a:solidFill>
-                          <a:schemeClr val="bg1"/>
-                        </a:solidFill>
-                      </a:endParaRPr>
                     </a:p>
                   </a:txBody>
                   <a:tcPr/>
@@ -8661,14 +8460,14 @@
           <p:nvPr>
             <p:extLst>
               <p:ext uri="{D42A27DB-BD31-4B8C-83A1-F6EECF244321}">
-                <p14:modId xmlns:p14="http://schemas.microsoft.com/office/powerpoint/2010/main" val="657696867"/>
+                <p14:modId xmlns:p14="http://schemas.microsoft.com/office/powerpoint/2010/main" val="3294340884"/>
               </p:ext>
             </p:extLst>
           </p:nvPr>
         </p:nvGraphicFramePr>
         <p:xfrm>
           <a:off x="742950" y="2278112"/>
-          <a:ext cx="10997946" cy="4312920"/>
+          <a:ext cx="10997946" cy="4008120"/>
         </p:xfrm>
         <a:graphic>
           <a:graphicData uri="http://schemas.openxmlformats.org/drawingml/2006/table">
@@ -8721,14 +8520,14 @@
                     <a:p>
                       <a:pPr algn="ctr"/>
                       <a:r>
-                        <a:rPr lang="en-US" sz="1800" dirty="0" smtClean="0">
+                        <a:rPr lang="en-US" sz="1600" dirty="0" smtClean="0">
                           <a:solidFill>
                             <a:schemeClr val="bg1"/>
                           </a:solidFill>
                         </a:rPr>
                         <a:t>Feature Set Chosen</a:t>
                       </a:r>
-                      <a:endParaRPr lang="en-US" sz="1800" dirty="0">
+                      <a:endParaRPr lang="en-US" sz="1600" dirty="0">
                         <a:solidFill>
                           <a:schemeClr val="bg1"/>
                         </a:solidFill>
@@ -8875,7 +8674,7 @@
                     <a:p>
                       <a:pPr algn="ctr"/>
                       <a:r>
-                        <a:rPr lang="en-US" dirty="0">
+                        <a:rPr lang="en-US" sz="1600" dirty="0">
                           <a:solidFill>
                             <a:schemeClr val="bg1"/>
                           </a:solidFill>
@@ -8909,7 +8708,7 @@
                         <a:defRPr/>
                       </a:pPr>
                       <a:r>
-                        <a:rPr lang="en-US" sz="1800" dirty="0">
+                        <a:rPr lang="en-US" sz="1600" dirty="0">
                           <a:solidFill>
                             <a:schemeClr val="bg1"/>
                           </a:solidFill>
@@ -8943,7 +8742,7 @@
                         <a:defRPr/>
                       </a:pPr>
                       <a:r>
-                        <a:rPr lang="en-US" sz="1800" dirty="0">
+                        <a:rPr lang="en-US" sz="1600" dirty="0">
                           <a:solidFill>
                             <a:schemeClr val="bg1"/>
                           </a:solidFill>
@@ -8977,7 +8776,7 @@
                         <a:defRPr/>
                       </a:pPr>
                       <a:r>
-                        <a:rPr lang="en-US" sz="1800" dirty="0">
+                        <a:rPr lang="en-US" sz="1600" dirty="0">
                           <a:solidFill>
                             <a:schemeClr val="bg1"/>
                           </a:solidFill>
@@ -9011,7 +8810,7 @@
                         <a:defRPr/>
                       </a:pPr>
                       <a:r>
-                        <a:rPr lang="en-US" sz="1800" dirty="0">
+                        <a:rPr lang="en-US" sz="1600" dirty="0">
                           <a:solidFill>
                             <a:schemeClr val="bg1"/>
                           </a:solidFill>
@@ -9052,7 +8851,7 @@
                         <a:defRPr/>
                       </a:pPr>
                       <a:r>
-                        <a:rPr lang="en-US" sz="1800" dirty="0">
+                        <a:rPr lang="en-US" sz="1600" dirty="0">
                           <a:solidFill>
                             <a:schemeClr val="bg1"/>
                           </a:solidFill>
@@ -9060,14 +8859,14 @@
                         <a:t>Support Vector </a:t>
                       </a:r>
                       <a:r>
-                        <a:rPr lang="en-US" sz="1800" dirty="0" smtClean="0">
+                        <a:rPr lang="en-US" sz="1600" dirty="0" smtClean="0">
                           <a:solidFill>
                             <a:schemeClr val="bg1"/>
                           </a:solidFill>
                         </a:rPr>
                         <a:t>Machines (Scaled)</a:t>
                       </a:r>
-                      <a:endParaRPr lang="en-US" sz="1800" dirty="0">
+                      <a:endParaRPr lang="en-US" sz="1600" dirty="0">
                         <a:solidFill>
                           <a:schemeClr val="bg1"/>
                         </a:solidFill>
@@ -9082,14 +8881,14 @@
                     <a:lstStyle/>
                     <a:p>
                       <a:r>
-                        <a:rPr lang="en-US" dirty="0" smtClean="0">
+                        <a:rPr lang="en-US" sz="1600" dirty="0" smtClean="0">
                           <a:solidFill>
                             <a:schemeClr val="bg1"/>
                           </a:solidFill>
                         </a:rPr>
                         <a:t>0.76</a:t>
                       </a:r>
-                      <a:endParaRPr lang="en-US" dirty="0">
+                      <a:endParaRPr lang="en-US" sz="1600" dirty="0">
                         <a:solidFill>
                           <a:schemeClr val="bg1"/>
                         </a:solidFill>
@@ -9104,7 +8903,7 @@
                     <a:lstStyle/>
                     <a:p>
                       <a:r>
-                        <a:rPr lang="en-US" dirty="0">
+                        <a:rPr lang="en-US" sz="1600" dirty="0">
                           <a:solidFill>
                             <a:schemeClr val="bg1"/>
                           </a:solidFill>
@@ -9112,14 +8911,14 @@
                         <a:t>Blue: </a:t>
                       </a:r>
                       <a:r>
-                        <a:rPr lang="en-US" dirty="0" smtClean="0">
+                        <a:rPr lang="en-US" sz="1600" dirty="0" smtClean="0">
                           <a:solidFill>
                             <a:schemeClr val="bg1"/>
                           </a:solidFill>
                         </a:rPr>
                         <a:t>0.86</a:t>
                       </a:r>
-                      <a:endParaRPr lang="en-US" dirty="0">
+                      <a:endParaRPr lang="en-US" sz="1600" dirty="0">
                         <a:solidFill>
                           <a:schemeClr val="bg1"/>
                         </a:solidFill>
@@ -9127,7 +8926,7 @@
                     </a:p>
                     <a:p>
                       <a:r>
-                        <a:rPr lang="en-US" dirty="0">
+                        <a:rPr lang="en-US" sz="1600" dirty="0">
                           <a:solidFill>
                             <a:schemeClr val="bg1"/>
                           </a:solidFill>
@@ -9135,14 +8934,14 @@
                         <a:t>Red: </a:t>
                       </a:r>
                       <a:r>
-                        <a:rPr lang="en-US" dirty="0" smtClean="0">
+                        <a:rPr lang="en-US" sz="1600" dirty="0" smtClean="0">
                           <a:solidFill>
                             <a:schemeClr val="bg1"/>
                           </a:solidFill>
                         </a:rPr>
                         <a:t>0.73</a:t>
                       </a:r>
-                      <a:endParaRPr lang="en-US" dirty="0">
+                      <a:endParaRPr lang="en-US" sz="1600" dirty="0">
                         <a:solidFill>
                           <a:schemeClr val="bg1"/>
                         </a:solidFill>
@@ -9157,7 +8956,7 @@
                     <a:lstStyle/>
                     <a:p>
                       <a:r>
-                        <a:rPr lang="en-US" dirty="0">
+                        <a:rPr lang="en-US" sz="1600" dirty="0">
                           <a:solidFill>
                             <a:schemeClr val="bg1"/>
                           </a:solidFill>
@@ -9165,14 +8964,14 @@
                         <a:t>Blue: </a:t>
                       </a:r>
                       <a:r>
-                        <a:rPr lang="en-US" dirty="0" smtClean="0">
+                        <a:rPr lang="en-US" sz="1600" dirty="0" smtClean="0">
                           <a:solidFill>
                             <a:schemeClr val="bg1"/>
                           </a:solidFill>
                         </a:rPr>
                         <a:t>0.51</a:t>
                       </a:r>
-                      <a:endParaRPr lang="en-US" dirty="0">
+                      <a:endParaRPr lang="en-US" sz="1600" dirty="0">
                         <a:solidFill>
                           <a:schemeClr val="bg1"/>
                         </a:solidFill>
@@ -9180,7 +8979,7 @@
                     </a:p>
                     <a:p>
                       <a:r>
-                        <a:rPr lang="en-US" dirty="0">
+                        <a:rPr lang="en-US" sz="1600" dirty="0">
                           <a:solidFill>
                             <a:schemeClr val="bg1"/>
                           </a:solidFill>
@@ -9188,14 +8987,14 @@
                         <a:t>Red: </a:t>
                       </a:r>
                       <a:r>
-                        <a:rPr lang="en-US" dirty="0" smtClean="0">
+                        <a:rPr lang="en-US" sz="1600" dirty="0" smtClean="0">
                           <a:solidFill>
                             <a:schemeClr val="bg1"/>
                           </a:solidFill>
                         </a:rPr>
                         <a:t>0.94</a:t>
                       </a:r>
-                      <a:endParaRPr lang="en-US" dirty="0">
+                      <a:endParaRPr lang="en-US" sz="1600" dirty="0">
                         <a:solidFill>
                           <a:schemeClr val="bg1"/>
                         </a:solidFill>
@@ -9210,7 +9009,7 @@
                     <a:lstStyle/>
                     <a:p>
                       <a:r>
-                        <a:rPr lang="en-US" dirty="0">
+                        <a:rPr lang="en-US" sz="1600" dirty="0">
                           <a:solidFill>
                             <a:schemeClr val="bg1"/>
                           </a:solidFill>
@@ -9218,14 +9017,14 @@
                         <a:t>Blue: </a:t>
                       </a:r>
                       <a:r>
-                        <a:rPr lang="en-US" dirty="0" smtClean="0">
+                        <a:rPr lang="en-US" sz="1600" dirty="0" smtClean="0">
                           <a:solidFill>
                             <a:schemeClr val="bg1"/>
                           </a:solidFill>
                         </a:rPr>
                         <a:t>0.64 </a:t>
                       </a:r>
-                      <a:endParaRPr lang="en-US" dirty="0">
+                      <a:endParaRPr lang="en-US" sz="1600" dirty="0">
                         <a:solidFill>
                           <a:schemeClr val="bg1"/>
                         </a:solidFill>
@@ -9233,7 +9032,7 @@
                     </a:p>
                     <a:p>
                       <a:r>
-                        <a:rPr lang="en-US" dirty="0">
+                        <a:rPr lang="en-US" sz="1600" dirty="0">
                           <a:solidFill>
                             <a:schemeClr val="bg1"/>
                           </a:solidFill>
@@ -9241,14 +9040,14 @@
                         <a:t>Red: </a:t>
                       </a:r>
                       <a:r>
-                        <a:rPr lang="en-US" dirty="0" smtClean="0">
+                        <a:rPr lang="en-US" sz="1600" dirty="0" smtClean="0">
                           <a:solidFill>
                             <a:schemeClr val="bg1"/>
                           </a:solidFill>
                         </a:rPr>
                         <a:t>0.82</a:t>
                       </a:r>
-                      <a:endParaRPr lang="en-US" dirty="0">
+                      <a:endParaRPr lang="en-US" sz="1600" dirty="0">
                         <a:solidFill>
                           <a:schemeClr val="bg1"/>
                         </a:solidFill>
@@ -9287,7 +9086,7 @@
                         <a:defRPr/>
                       </a:pPr>
                       <a:r>
-                        <a:rPr lang="en-US" sz="1800" dirty="0">
+                        <a:rPr lang="en-US" sz="1600" dirty="0">
                           <a:solidFill>
                             <a:schemeClr val="bg1"/>
                           </a:solidFill>
@@ -9304,14 +9103,14 @@
                     <a:lstStyle/>
                     <a:p>
                       <a:r>
-                        <a:rPr lang="en-US" dirty="0" smtClean="0">
+                        <a:rPr lang="en-US" sz="1600" dirty="0" smtClean="0">
                           <a:solidFill>
                             <a:schemeClr val="bg1"/>
                           </a:solidFill>
                         </a:rPr>
                         <a:t>0.76</a:t>
                       </a:r>
-                      <a:endParaRPr lang="en-US" dirty="0">
+                      <a:endParaRPr lang="en-US" sz="1600" dirty="0">
                         <a:solidFill>
                           <a:schemeClr val="bg1"/>
                         </a:solidFill>
@@ -9326,7 +9125,7 @@
                     <a:lstStyle/>
                     <a:p>
                       <a:r>
-                        <a:rPr lang="en-US" dirty="0">
+                        <a:rPr lang="en-US" sz="1600" dirty="0">
                           <a:solidFill>
                             <a:schemeClr val="bg1"/>
                           </a:solidFill>
@@ -9334,14 +9133,14 @@
                         <a:t>Blue: </a:t>
                       </a:r>
                       <a:r>
-                        <a:rPr lang="en-US" dirty="0" smtClean="0">
+                        <a:rPr lang="en-US" sz="1600" dirty="0" smtClean="0">
                           <a:solidFill>
                             <a:schemeClr val="bg1"/>
                           </a:solidFill>
                         </a:rPr>
                         <a:t>0.80</a:t>
                       </a:r>
-                      <a:endParaRPr lang="en-US" dirty="0">
+                      <a:endParaRPr lang="en-US" sz="1600" dirty="0">
                         <a:solidFill>
                           <a:schemeClr val="bg1"/>
                         </a:solidFill>
@@ -9349,7 +9148,7 @@
                     </a:p>
                     <a:p>
                       <a:r>
-                        <a:rPr lang="en-US" dirty="0">
+                        <a:rPr lang="en-US" sz="1600" dirty="0">
                           <a:solidFill>
                             <a:schemeClr val="bg1"/>
                           </a:solidFill>
@@ -9357,14 +9156,14 @@
                         <a:t>Red: </a:t>
                       </a:r>
                       <a:r>
-                        <a:rPr lang="en-US" dirty="0" smtClean="0">
+                        <a:rPr lang="en-US" sz="1600" dirty="0" smtClean="0">
                           <a:solidFill>
                             <a:schemeClr val="bg1"/>
                           </a:solidFill>
                         </a:rPr>
                         <a:t>0.75</a:t>
                       </a:r>
-                      <a:endParaRPr lang="en-US" dirty="0">
+                      <a:endParaRPr lang="en-US" sz="1600" dirty="0">
                         <a:solidFill>
                           <a:schemeClr val="bg1"/>
                         </a:solidFill>
@@ -9379,7 +9178,7 @@
                     <a:lstStyle/>
                     <a:p>
                       <a:r>
-                        <a:rPr lang="en-US" dirty="0">
+                        <a:rPr lang="en-US" sz="1600" dirty="0">
                           <a:solidFill>
                             <a:schemeClr val="bg1"/>
                           </a:solidFill>
@@ -9387,14 +9186,14 @@
                         <a:t>Blue: </a:t>
                       </a:r>
                       <a:r>
-                        <a:rPr lang="en-US" dirty="0" smtClean="0">
+                        <a:rPr lang="en-US" sz="1600" dirty="0" smtClean="0">
                           <a:solidFill>
                             <a:schemeClr val="bg1"/>
                           </a:solidFill>
                         </a:rPr>
                         <a:t>0.56</a:t>
                       </a:r>
-                      <a:endParaRPr lang="en-US" dirty="0">
+                      <a:endParaRPr lang="en-US" sz="1600" dirty="0">
                         <a:solidFill>
                           <a:schemeClr val="bg1"/>
                         </a:solidFill>
@@ -9402,7 +9201,7 @@
                     </a:p>
                     <a:p>
                       <a:r>
-                        <a:rPr lang="en-US" dirty="0">
+                        <a:rPr lang="en-US" sz="1600" dirty="0">
                           <a:solidFill>
                             <a:schemeClr val="bg1"/>
                           </a:solidFill>
@@ -9410,14 +9209,14 @@
                         <a:t>Red: </a:t>
                       </a:r>
                       <a:r>
-                        <a:rPr lang="en-US" dirty="0" smtClean="0">
+                        <a:rPr lang="en-US" sz="1600" dirty="0" smtClean="0">
                           <a:solidFill>
                             <a:schemeClr val="bg1"/>
                           </a:solidFill>
                         </a:rPr>
                         <a:t>0.90</a:t>
                       </a:r>
-                      <a:endParaRPr lang="en-US" dirty="0">
+                      <a:endParaRPr lang="en-US" sz="1600" dirty="0">
                         <a:solidFill>
                           <a:schemeClr val="bg1"/>
                         </a:solidFill>
@@ -9432,7 +9231,7 @@
                     <a:lstStyle/>
                     <a:p>
                       <a:r>
-                        <a:rPr lang="en-US" dirty="0">
+                        <a:rPr lang="en-US" sz="1600" dirty="0">
                           <a:solidFill>
                             <a:schemeClr val="bg1"/>
                           </a:solidFill>
@@ -9440,14 +9239,14 @@
                         <a:t>Blue: </a:t>
                       </a:r>
                       <a:r>
-                        <a:rPr lang="en-US" dirty="0" smtClean="0">
+                        <a:rPr lang="en-US" sz="1600" dirty="0" smtClean="0">
                           <a:solidFill>
                             <a:schemeClr val="bg1"/>
                           </a:solidFill>
                         </a:rPr>
                         <a:t>0.66</a:t>
                       </a:r>
-                      <a:endParaRPr lang="en-US" dirty="0">
+                      <a:endParaRPr lang="en-US" sz="1600" dirty="0">
                         <a:solidFill>
                           <a:schemeClr val="bg1"/>
                         </a:solidFill>
@@ -9455,7 +9254,7 @@
                     </a:p>
                     <a:p>
                       <a:r>
-                        <a:rPr lang="en-US" dirty="0">
+                        <a:rPr lang="en-US" sz="1600" dirty="0">
                           <a:solidFill>
                             <a:schemeClr val="bg1"/>
                           </a:solidFill>
@@ -9496,7 +9295,7 @@
                         <a:defRPr/>
                       </a:pPr>
                       <a:r>
-                        <a:rPr lang="en-US" sz="1800" dirty="0">
+                        <a:rPr lang="en-US" sz="1600" dirty="0">
                           <a:solidFill>
                             <a:schemeClr val="bg1"/>
                           </a:solidFill>
@@ -9513,14 +9312,14 @@
                     <a:lstStyle/>
                     <a:p>
                       <a:r>
-                        <a:rPr lang="en-US" dirty="0" smtClean="0">
+                        <a:rPr lang="en-US" sz="1600" dirty="0" smtClean="0">
                           <a:solidFill>
                             <a:schemeClr val="bg1"/>
                           </a:solidFill>
                         </a:rPr>
                         <a:t>0.76</a:t>
                       </a:r>
-                      <a:endParaRPr lang="en-US" dirty="0">
+                      <a:endParaRPr lang="en-US" sz="1600" dirty="0">
                         <a:solidFill>
                           <a:schemeClr val="bg1"/>
                         </a:solidFill>
@@ -9535,7 +9334,7 @@
                     <a:lstStyle/>
                     <a:p>
                       <a:r>
-                        <a:rPr lang="en-US" dirty="0">
+                        <a:rPr lang="en-US" sz="1600" dirty="0">
                           <a:solidFill>
                             <a:schemeClr val="bg1"/>
                           </a:solidFill>
@@ -9545,7 +9344,7 @@
                     </a:p>
                     <a:p>
                       <a:r>
-                        <a:rPr lang="en-US" dirty="0">
+                        <a:rPr lang="en-US" sz="1600" dirty="0">
                           <a:solidFill>
                             <a:schemeClr val="bg1"/>
                           </a:solidFill>
@@ -9553,14 +9352,14 @@
                         <a:t>Red: </a:t>
                       </a:r>
                       <a:r>
-                        <a:rPr lang="en-US" dirty="0" smtClean="0">
+                        <a:rPr lang="en-US" sz="1600" dirty="0" smtClean="0">
                           <a:solidFill>
                             <a:schemeClr val="bg1"/>
                           </a:solidFill>
                         </a:rPr>
                         <a:t>0.76</a:t>
                       </a:r>
-                      <a:endParaRPr lang="en-US" dirty="0">
+                      <a:endParaRPr lang="en-US" sz="1600" dirty="0">
                         <a:solidFill>
                           <a:schemeClr val="bg1"/>
                         </a:solidFill>
@@ -9575,7 +9374,7 @@
                     <a:lstStyle/>
                     <a:p>
                       <a:r>
-                        <a:rPr lang="en-US" dirty="0">
+                        <a:rPr lang="en-US" sz="1600" dirty="0">
                           <a:solidFill>
                             <a:schemeClr val="bg1"/>
                           </a:solidFill>
@@ -9583,14 +9382,14 @@
                         <a:t>Blue: </a:t>
                       </a:r>
                       <a:r>
-                        <a:rPr lang="en-US" dirty="0" smtClean="0">
+                        <a:rPr lang="en-US" sz="1600" dirty="0" smtClean="0">
                           <a:solidFill>
                             <a:schemeClr val="bg1"/>
                           </a:solidFill>
                         </a:rPr>
                         <a:t>0.62</a:t>
                       </a:r>
-                      <a:endParaRPr lang="en-US" dirty="0">
+                      <a:endParaRPr lang="en-US" sz="1600" dirty="0">
                         <a:solidFill>
                           <a:schemeClr val="bg1"/>
                         </a:solidFill>
@@ -9598,7 +9397,7 @@
                     </a:p>
                     <a:p>
                       <a:r>
-                        <a:rPr lang="en-US" dirty="0">
+                        <a:rPr lang="en-US" sz="1600" dirty="0">
                           <a:solidFill>
                             <a:schemeClr val="bg1"/>
                           </a:solidFill>
@@ -9606,14 +9405,14 @@
                         <a:t>Red: </a:t>
                       </a:r>
                       <a:r>
-                        <a:rPr lang="en-US" dirty="0" smtClean="0">
+                        <a:rPr lang="en-US" sz="1600" dirty="0" smtClean="0">
                           <a:solidFill>
                             <a:schemeClr val="bg1"/>
                           </a:solidFill>
                         </a:rPr>
                         <a:t>0.85</a:t>
                       </a:r>
-                      <a:endParaRPr lang="en-US" dirty="0">
+                      <a:endParaRPr lang="en-US" sz="1600" dirty="0">
                         <a:solidFill>
                           <a:schemeClr val="bg1"/>
                         </a:solidFill>
@@ -9628,7 +9427,7 @@
                     <a:lstStyle/>
                     <a:p>
                       <a:r>
-                        <a:rPr lang="en-US" dirty="0">
+                        <a:rPr lang="en-US" sz="1600" dirty="0">
                           <a:solidFill>
                             <a:schemeClr val="bg1"/>
                           </a:solidFill>
@@ -9636,14 +9435,14 @@
                         <a:t>Blue: </a:t>
                       </a:r>
                       <a:r>
-                        <a:rPr lang="en-US" dirty="0" smtClean="0">
+                        <a:rPr lang="en-US" sz="1600" dirty="0" smtClean="0">
                           <a:solidFill>
                             <a:schemeClr val="bg1"/>
                           </a:solidFill>
                         </a:rPr>
                         <a:t>0.68</a:t>
                       </a:r>
-                      <a:endParaRPr lang="en-US" dirty="0">
+                      <a:endParaRPr lang="en-US" sz="1600" dirty="0">
                         <a:solidFill>
                           <a:schemeClr val="bg1"/>
                         </a:solidFill>
@@ -9651,7 +9450,7 @@
                     </a:p>
                     <a:p>
                       <a:r>
-                        <a:rPr lang="en-US" dirty="0">
+                        <a:rPr lang="en-US" sz="1600" dirty="0">
                           <a:solidFill>
                             <a:schemeClr val="bg1"/>
                           </a:solidFill>
@@ -9659,14 +9458,14 @@
                         <a:t>Red: </a:t>
                       </a:r>
                       <a:r>
-                        <a:rPr lang="en-US" dirty="0" smtClean="0">
+                        <a:rPr lang="en-US" sz="1600" dirty="0" smtClean="0">
                           <a:solidFill>
                             <a:schemeClr val="bg1"/>
                           </a:solidFill>
                         </a:rPr>
                         <a:t>0.80</a:t>
                       </a:r>
-                      <a:endParaRPr lang="en-US" dirty="0">
+                      <a:endParaRPr lang="en-US" sz="1600" dirty="0">
                         <a:solidFill>
                           <a:schemeClr val="bg1"/>
                         </a:solidFill>
@@ -9705,48 +9504,30 @@
                         <a:defRPr/>
                       </a:pPr>
                       <a:r>
-                        <a:rPr lang="en-US" sz="1800" dirty="0">
-                          <a:solidFill>
-                            <a:schemeClr val="bg1"/>
-                          </a:solidFill>
-                        </a:rPr>
-                        <a:t>Deep Learning</a:t>
-                      </a:r>
-                    </a:p>
-                  </a:txBody>
-                  <a:tcPr/>
-                </a:tc>
-                <a:tc>
-                  <a:txBody>
-                    <a:bodyPr/>
-                    <a:lstStyle/>
-                    <a:p>
-                      <a:r>
-                        <a:rPr lang="en-US" dirty="0">
-                          <a:solidFill>
-                            <a:schemeClr val="bg1"/>
-                          </a:solidFill>
-                        </a:rPr>
-                        <a:t>0.76</a:t>
-                      </a:r>
-                    </a:p>
-                  </a:txBody>
-                  <a:tcPr/>
-                </a:tc>
-                <a:tc>
-                  <a:txBody>
-                    <a:bodyPr/>
-                    <a:lstStyle/>
-                    <a:p>
-                      <a:r>
-                        <a:rPr lang="en-US" dirty="0" smtClean="0">
-                          <a:solidFill>
-                            <a:schemeClr val="bg1"/>
-                          </a:solidFill>
-                        </a:rPr>
-                        <a:t>NA</a:t>
-                      </a:r>
-                      <a:endParaRPr lang="en-US" dirty="0">
+                        <a:rPr lang="en-US" sz="1600" dirty="0" smtClean="0">
+                          <a:solidFill>
+                            <a:schemeClr val="bg1"/>
+                          </a:solidFill>
+                        </a:rPr>
+                        <a:t>Deep Learning (</a:t>
+                      </a:r>
+                      <a:r>
+                        <a:rPr lang="en-US" sz="1600" dirty="0" err="1" smtClean="0">
+                          <a:solidFill>
+                            <a:schemeClr val="bg1"/>
+                          </a:solidFill>
+                        </a:rPr>
+                        <a:t>Tensorflow</a:t>
+                      </a:r>
+                      <a:r>
+                        <a:rPr lang="en-US" sz="1600" dirty="0" smtClean="0">
+                          <a:solidFill>
+                            <a:schemeClr val="bg1"/>
+                          </a:solidFill>
+                        </a:rPr>
+                        <a:t>)</a:t>
+                      </a:r>
+                      <a:endParaRPr lang="en-US" sz="1600" dirty="0">
                         <a:solidFill>
                           <a:schemeClr val="bg1"/>
                         </a:solidFill>
@@ -9761,14 +9542,31 @@
                     <a:lstStyle/>
                     <a:p>
                       <a:r>
-                        <a:rPr lang="en-US" dirty="0" smtClean="0">
+                        <a:rPr lang="en-US" sz="1600" dirty="0">
+                          <a:solidFill>
+                            <a:schemeClr val="bg1"/>
+                          </a:solidFill>
+                        </a:rPr>
+                        <a:t>0.76</a:t>
+                      </a:r>
+                    </a:p>
+                  </a:txBody>
+                  <a:tcPr/>
+                </a:tc>
+                <a:tc>
+                  <a:txBody>
+                    <a:bodyPr/>
+                    <a:lstStyle/>
+                    <a:p>
+                      <a:r>
+                        <a:rPr lang="en-US" sz="1600" dirty="0" smtClean="0">
                           <a:solidFill>
                             <a:schemeClr val="bg1"/>
                           </a:solidFill>
                         </a:rPr>
                         <a:t>NA</a:t>
                       </a:r>
-                      <a:endParaRPr lang="en-US" dirty="0">
+                      <a:endParaRPr lang="en-US" sz="1600" dirty="0">
                         <a:solidFill>
                           <a:schemeClr val="bg1"/>
                         </a:solidFill>
@@ -9783,14 +9581,36 @@
                     <a:lstStyle/>
                     <a:p>
                       <a:r>
-                        <a:rPr lang="en-US" dirty="0" smtClean="0">
+                        <a:rPr lang="en-US" sz="1600" dirty="0" smtClean="0">
                           <a:solidFill>
                             <a:schemeClr val="bg1"/>
                           </a:solidFill>
                         </a:rPr>
                         <a:t>NA</a:t>
                       </a:r>
-                      <a:endParaRPr lang="en-US" dirty="0">
+                      <a:endParaRPr lang="en-US" sz="1600" dirty="0">
+                        <a:solidFill>
+                          <a:schemeClr val="bg1"/>
+                        </a:solidFill>
+                      </a:endParaRPr>
+                    </a:p>
+                  </a:txBody>
+                  <a:tcPr/>
+                </a:tc>
+                <a:tc>
+                  <a:txBody>
+                    <a:bodyPr/>
+                    <a:lstStyle/>
+                    <a:p>
+                      <a:r>
+                        <a:rPr lang="en-US" sz="1600" dirty="0" smtClean="0">
+                          <a:solidFill>
+                            <a:schemeClr val="bg1"/>
+                          </a:solidFill>
+                        </a:rPr>
+                        <a:t>NA</a:t>
+                      </a:r>
+                      <a:endParaRPr lang="en-US" sz="1600" dirty="0">
                         <a:solidFill>
                           <a:schemeClr val="bg1"/>
                         </a:solidFill>
@@ -9829,7 +9649,7 @@
                         <a:defRPr/>
                       </a:pPr>
                       <a:r>
-                        <a:rPr lang="en-US" sz="1800" dirty="0">
+                        <a:rPr lang="en-US" sz="1600" dirty="0">
                           <a:solidFill>
                             <a:schemeClr val="bg1"/>
                           </a:solidFill>
@@ -9837,14 +9657,14 @@
                         <a:t>K-Nearest </a:t>
                       </a:r>
                       <a:r>
-                        <a:rPr lang="en-US" sz="1800" dirty="0" smtClean="0">
+                        <a:rPr lang="en-US" sz="1600" dirty="0" smtClean="0">
                           <a:solidFill>
                             <a:schemeClr val="bg1"/>
                           </a:solidFill>
                         </a:rPr>
                         <a:t>Neighbors (Scaled)</a:t>
                       </a:r>
-                      <a:endParaRPr lang="en-US" sz="1800" dirty="0">
+                      <a:endParaRPr lang="en-US" sz="1600" dirty="0">
                         <a:solidFill>
                           <a:schemeClr val="bg1"/>
                         </a:solidFill>
@@ -9859,14 +9679,14 @@
                     <a:lstStyle/>
                     <a:p>
                       <a:r>
-                        <a:rPr lang="en-US" dirty="0" smtClean="0">
+                        <a:rPr lang="en-US" sz="1600" dirty="0" smtClean="0">
                           <a:solidFill>
                             <a:schemeClr val="bg1"/>
                           </a:solidFill>
                         </a:rPr>
                         <a:t>0.71</a:t>
                       </a:r>
-                      <a:endParaRPr lang="en-US" dirty="0">
+                      <a:endParaRPr lang="en-US" sz="1600" dirty="0">
                         <a:solidFill>
                           <a:schemeClr val="bg1"/>
                         </a:solidFill>
@@ -9881,7 +9701,7 @@
                     <a:lstStyle/>
                     <a:p>
                       <a:r>
-                        <a:rPr lang="en-US" dirty="0">
+                        <a:rPr lang="en-US" sz="1600" dirty="0">
                           <a:solidFill>
                             <a:schemeClr val="bg1"/>
                           </a:solidFill>
@@ -9889,14 +9709,14 @@
                         <a:t>Blue: </a:t>
                       </a:r>
                       <a:r>
-                        <a:rPr lang="en-US" dirty="0" smtClean="0">
+                        <a:rPr lang="en-US" sz="1600" dirty="0" smtClean="0">
                           <a:solidFill>
                             <a:schemeClr val="bg1"/>
                           </a:solidFill>
                         </a:rPr>
                         <a:t>0.69</a:t>
                       </a:r>
-                      <a:endParaRPr lang="en-US" dirty="0">
+                      <a:endParaRPr lang="en-US" sz="1600" dirty="0">
                         <a:solidFill>
                           <a:schemeClr val="bg1"/>
                         </a:solidFill>
@@ -9904,7 +9724,7 @@
                     </a:p>
                     <a:p>
                       <a:r>
-                        <a:rPr lang="en-US" dirty="0">
+                        <a:rPr lang="en-US" sz="1600" dirty="0">
                           <a:solidFill>
                             <a:schemeClr val="bg1"/>
                           </a:solidFill>
@@ -9912,14 +9732,14 @@
                         <a:t>Red: </a:t>
                       </a:r>
                       <a:r>
-                        <a:rPr lang="en-US" dirty="0" smtClean="0">
+                        <a:rPr lang="en-US" sz="1600" dirty="0" smtClean="0">
                           <a:solidFill>
                             <a:schemeClr val="bg1"/>
                           </a:solidFill>
                         </a:rPr>
                         <a:t>0.73</a:t>
                       </a:r>
-                      <a:endParaRPr lang="en-US" dirty="0">
+                      <a:endParaRPr lang="en-US" sz="1600" dirty="0">
                         <a:solidFill>
                           <a:schemeClr val="bg1"/>
                         </a:solidFill>
@@ -9934,7 +9754,7 @@
                     <a:lstStyle/>
                     <a:p>
                       <a:r>
-                        <a:rPr lang="en-US" dirty="0">
+                        <a:rPr lang="en-US" sz="1600" dirty="0">
                           <a:solidFill>
                             <a:schemeClr val="bg1"/>
                           </a:solidFill>
@@ -9942,14 +9762,14 @@
                         <a:t>Blue: </a:t>
                       </a:r>
                       <a:r>
-                        <a:rPr lang="en-US" dirty="0" smtClean="0">
+                        <a:rPr lang="en-US" sz="1600" dirty="0" smtClean="0">
                           <a:solidFill>
                             <a:schemeClr val="bg1"/>
                           </a:solidFill>
                         </a:rPr>
                         <a:t>0.56</a:t>
                       </a:r>
-                      <a:endParaRPr lang="en-US" dirty="0">
+                      <a:endParaRPr lang="en-US" sz="1600" dirty="0">
                         <a:solidFill>
                           <a:schemeClr val="bg1"/>
                         </a:solidFill>
@@ -9957,7 +9777,7 @@
                     </a:p>
                     <a:p>
                       <a:r>
-                        <a:rPr lang="en-US" dirty="0">
+                        <a:rPr lang="en-US" sz="1600" dirty="0">
                           <a:solidFill>
                             <a:schemeClr val="bg1"/>
                           </a:solidFill>
@@ -9965,14 +9785,14 @@
                         <a:t>Red: </a:t>
                       </a:r>
                       <a:r>
-                        <a:rPr lang="en-US" dirty="0" smtClean="0">
+                        <a:rPr lang="en-US" sz="1600" dirty="0" smtClean="0">
                           <a:solidFill>
                             <a:schemeClr val="bg1"/>
                           </a:solidFill>
                         </a:rPr>
                         <a:t>0.83</a:t>
                       </a:r>
-                      <a:endParaRPr lang="en-US" dirty="0">
+                      <a:endParaRPr lang="en-US" sz="1600" dirty="0">
                         <a:solidFill>
                           <a:schemeClr val="bg1"/>
                         </a:solidFill>
@@ -9987,7 +9807,7 @@
                     <a:lstStyle/>
                     <a:p>
                       <a:r>
-                        <a:rPr lang="en-US" dirty="0">
+                        <a:rPr lang="en-US" sz="1600" dirty="0">
                           <a:solidFill>
                             <a:schemeClr val="bg1"/>
                           </a:solidFill>
@@ -9995,14 +9815,14 @@
                         <a:t>Blue: </a:t>
                       </a:r>
                       <a:r>
-                        <a:rPr lang="en-US" dirty="0" smtClean="0">
+                        <a:rPr lang="en-US" sz="1600" dirty="0" smtClean="0">
                           <a:solidFill>
                             <a:schemeClr val="bg1"/>
                           </a:solidFill>
                         </a:rPr>
                         <a:t>0.62</a:t>
                       </a:r>
-                      <a:endParaRPr lang="en-US" dirty="0">
+                      <a:endParaRPr lang="en-US" sz="1600" dirty="0">
                         <a:solidFill>
                           <a:schemeClr val="bg1"/>
                         </a:solidFill>
@@ -10010,7 +9830,7 @@
                     </a:p>
                     <a:p>
                       <a:r>
-                        <a:rPr lang="en-US" dirty="0">
+                        <a:rPr lang="en-US" sz="1600" dirty="0">
                           <a:solidFill>
                             <a:schemeClr val="bg1"/>
                           </a:solidFill>
@@ -10018,14 +9838,14 @@
                         <a:t>Red: </a:t>
                       </a:r>
                       <a:r>
-                        <a:rPr lang="en-US" dirty="0" smtClean="0">
+                        <a:rPr lang="en-US" sz="1600" dirty="0" smtClean="0">
                           <a:solidFill>
                             <a:schemeClr val="bg1"/>
                           </a:solidFill>
                         </a:rPr>
                         <a:t>0.77</a:t>
                       </a:r>
-                      <a:endParaRPr lang="en-US" dirty="0">
+                      <a:endParaRPr lang="en-US" sz="1600" dirty="0">
                         <a:solidFill>
                           <a:schemeClr val="bg1"/>
                         </a:solidFill>
@@ -10064,7 +9884,7 @@
                         <a:defRPr/>
                       </a:pPr>
                       <a:r>
-                        <a:rPr lang="en-US" sz="1800" dirty="0">
+                        <a:rPr lang="en-US" sz="1600" dirty="0">
                           <a:solidFill>
                             <a:schemeClr val="bg1"/>
                           </a:solidFill>
@@ -10072,14 +9892,22 @@
                         <a:t>Neural </a:t>
                       </a:r>
                       <a:r>
-                        <a:rPr lang="en-US" sz="1800" dirty="0" smtClean="0">
-                          <a:solidFill>
-                            <a:schemeClr val="bg1"/>
-                          </a:solidFill>
-                        </a:rPr>
-                        <a:t>Networks (Scaled)</a:t>
-                      </a:r>
-                      <a:endParaRPr lang="en-US" sz="1800" dirty="0">
+                        <a:rPr lang="en-US" sz="1600" dirty="0" smtClean="0">
+                          <a:solidFill>
+                            <a:schemeClr val="bg1"/>
+                          </a:solidFill>
+                        </a:rPr>
+                        <a:t>Networks MLP </a:t>
+                      </a:r>
+                      <a:r>
+                        <a:rPr lang="en-US" sz="1600" dirty="0" smtClean="0">
+                          <a:solidFill>
+                            <a:schemeClr val="bg1"/>
+                          </a:solidFill>
+                        </a:rPr>
+                        <a:t>(Scaled)</a:t>
+                      </a:r>
+                      <a:endParaRPr lang="en-US" sz="1600" dirty="0">
                         <a:solidFill>
                           <a:schemeClr val="bg1"/>
                         </a:solidFill>
@@ -10094,14 +9922,14 @@
                     <a:lstStyle/>
                     <a:p>
                       <a:r>
-                        <a:rPr lang="en-US" dirty="0" smtClean="0">
+                        <a:rPr lang="en-US" sz="1600" dirty="0" smtClean="0">
                           <a:solidFill>
                             <a:schemeClr val="bg1"/>
                           </a:solidFill>
                         </a:rPr>
                         <a:t>0.71</a:t>
                       </a:r>
-                      <a:endParaRPr lang="en-US" dirty="0">
+                      <a:endParaRPr lang="en-US" sz="1600" dirty="0">
                         <a:solidFill>
                           <a:schemeClr val="bg1"/>
                         </a:solidFill>
@@ -10116,7 +9944,7 @@
                     <a:lstStyle/>
                     <a:p>
                       <a:r>
-                        <a:rPr lang="en-US" dirty="0">
+                        <a:rPr lang="en-US" sz="1600" dirty="0">
                           <a:solidFill>
                             <a:schemeClr val="bg1"/>
                           </a:solidFill>
@@ -10124,14 +9952,14 @@
                         <a:t>Blue: </a:t>
                       </a:r>
                       <a:r>
-                        <a:rPr lang="en-US" dirty="0" smtClean="0">
+                        <a:rPr lang="en-US" sz="1600" dirty="0" smtClean="0">
                           <a:solidFill>
                             <a:schemeClr val="bg1"/>
                           </a:solidFill>
                         </a:rPr>
                         <a:t>0.65</a:t>
                       </a:r>
-                      <a:endParaRPr lang="en-US" dirty="0">
+                      <a:endParaRPr lang="en-US" sz="1600" dirty="0">
                         <a:solidFill>
                           <a:schemeClr val="bg1"/>
                         </a:solidFill>
@@ -10139,7 +9967,7 @@
                     </a:p>
                     <a:p>
                       <a:r>
-                        <a:rPr lang="en-US" dirty="0">
+                        <a:rPr lang="en-US" sz="1600" dirty="0">
                           <a:solidFill>
                             <a:schemeClr val="bg1"/>
                           </a:solidFill>
@@ -10147,14 +9975,14 @@
                         <a:t>Red: </a:t>
                       </a:r>
                       <a:r>
-                        <a:rPr lang="en-US" dirty="0" smtClean="0">
+                        <a:rPr lang="en-US" sz="1600" dirty="0" smtClean="0">
                           <a:solidFill>
                             <a:schemeClr val="bg1"/>
                           </a:solidFill>
                         </a:rPr>
                         <a:t>0.75</a:t>
                       </a:r>
-                      <a:endParaRPr lang="en-US" dirty="0">
+                      <a:endParaRPr lang="en-US" sz="1600" dirty="0">
                         <a:solidFill>
                           <a:schemeClr val="bg1"/>
                         </a:solidFill>
@@ -10169,7 +9997,7 @@
                     <a:lstStyle/>
                     <a:p>
                       <a:r>
-                        <a:rPr lang="en-US" dirty="0">
+                        <a:rPr lang="en-US" sz="1600" dirty="0">
                           <a:solidFill>
                             <a:schemeClr val="bg1"/>
                           </a:solidFill>
@@ -10177,14 +10005,14 @@
                         <a:t>Blue: </a:t>
                       </a:r>
                       <a:r>
-                        <a:rPr lang="en-US" dirty="0" smtClean="0">
+                        <a:rPr lang="en-US" sz="1600" dirty="0" smtClean="0">
                           <a:solidFill>
                             <a:schemeClr val="bg1"/>
                           </a:solidFill>
                         </a:rPr>
                         <a:t>0.64</a:t>
                       </a:r>
-                      <a:endParaRPr lang="en-US" dirty="0">
+                      <a:endParaRPr lang="en-US" sz="1600" dirty="0">
                         <a:solidFill>
                           <a:schemeClr val="bg1"/>
                         </a:solidFill>
@@ -10192,7 +10020,7 @@
                     </a:p>
                     <a:p>
                       <a:r>
-                        <a:rPr lang="en-US" dirty="0">
+                        <a:rPr lang="en-US" sz="1600" dirty="0">
                           <a:solidFill>
                             <a:schemeClr val="bg1"/>
                           </a:solidFill>
@@ -10200,14 +10028,14 @@
                         <a:t>Red: </a:t>
                       </a:r>
                       <a:r>
-                        <a:rPr lang="en-US" dirty="0" smtClean="0">
+                        <a:rPr lang="en-US" sz="1600" dirty="0" smtClean="0">
                           <a:solidFill>
                             <a:schemeClr val="bg1"/>
                           </a:solidFill>
                         </a:rPr>
                         <a:t>0.76</a:t>
                       </a:r>
-                      <a:endParaRPr lang="en-US" dirty="0">
+                      <a:endParaRPr lang="en-US" sz="1600" dirty="0">
                         <a:solidFill>
                           <a:schemeClr val="bg1"/>
                         </a:solidFill>
@@ -10222,7 +10050,7 @@
                     <a:lstStyle/>
                     <a:p>
                       <a:r>
-                        <a:rPr lang="en-US" dirty="0">
+                        <a:rPr lang="en-US" sz="1600" dirty="0">
                           <a:solidFill>
                             <a:schemeClr val="bg1"/>
                           </a:solidFill>
@@ -10230,14 +10058,14 @@
                         <a:t>Blue: </a:t>
                       </a:r>
                       <a:r>
-                        <a:rPr lang="en-US" dirty="0" smtClean="0">
+                        <a:rPr lang="en-US" sz="1600" dirty="0" smtClean="0">
                           <a:solidFill>
                             <a:schemeClr val="bg1"/>
                           </a:solidFill>
                         </a:rPr>
                         <a:t>0.65</a:t>
                       </a:r>
-                      <a:endParaRPr lang="en-US" dirty="0">
+                      <a:endParaRPr lang="en-US" sz="1600" dirty="0">
                         <a:solidFill>
                           <a:schemeClr val="bg1"/>
                         </a:solidFill>
@@ -10245,7 +10073,7 @@
                     </a:p>
                     <a:p>
                       <a:r>
-                        <a:rPr lang="en-US" dirty="0">
+                        <a:rPr lang="en-US" sz="1600" dirty="0">
                           <a:solidFill>
                             <a:schemeClr val="bg1"/>
                           </a:solidFill>
@@ -10253,14 +10081,14 @@
                         <a:t>Red: </a:t>
                       </a:r>
                       <a:r>
-                        <a:rPr lang="en-US" dirty="0" smtClean="0">
+                        <a:rPr lang="en-US" sz="1600" dirty="0" smtClean="0">
                           <a:solidFill>
                             <a:schemeClr val="bg1"/>
                           </a:solidFill>
                         </a:rPr>
                         <a:t>0.76</a:t>
                       </a:r>
-                      <a:endParaRPr lang="en-US" dirty="0">
+                      <a:endParaRPr lang="en-US" sz="1600" dirty="0">
                         <a:solidFill>
                           <a:schemeClr val="bg1"/>
                         </a:solidFill>
@@ -10405,14 +10233,14 @@
           <p:nvPr>
             <p:extLst>
               <p:ext uri="{D42A27DB-BD31-4B8C-83A1-F6EECF244321}">
-                <p14:modId xmlns:p14="http://schemas.microsoft.com/office/powerpoint/2010/main" val="3392442586"/>
+                <p14:modId xmlns:p14="http://schemas.microsoft.com/office/powerpoint/2010/main" val="396899486"/>
               </p:ext>
             </p:extLst>
           </p:nvPr>
         </p:nvGraphicFramePr>
         <p:xfrm>
           <a:off x="742950" y="2278112"/>
-          <a:ext cx="10997946" cy="4312920"/>
+          <a:ext cx="10997946" cy="4008120"/>
         </p:xfrm>
         <a:graphic>
           <a:graphicData uri="http://schemas.openxmlformats.org/drawingml/2006/table">
@@ -10465,14 +10293,14 @@
                     <a:p>
                       <a:pPr algn="ctr"/>
                       <a:r>
-                        <a:rPr lang="en-US" sz="1800" dirty="0" smtClean="0">
+                        <a:rPr lang="en-US" sz="1600" dirty="0" smtClean="0">
                           <a:solidFill>
                             <a:schemeClr val="bg1"/>
                           </a:solidFill>
                         </a:rPr>
                         <a:t>Feature Set Random Forest</a:t>
                       </a:r>
-                      <a:endParaRPr lang="en-US" sz="1800" dirty="0">
+                      <a:endParaRPr lang="en-US" sz="1600" dirty="0">
                         <a:solidFill>
                           <a:schemeClr val="bg1"/>
                         </a:solidFill>
@@ -10619,7 +10447,7 @@
                     <a:p>
                       <a:pPr algn="ctr"/>
                       <a:r>
-                        <a:rPr lang="en-US" dirty="0">
+                        <a:rPr lang="en-US" sz="1600" dirty="0">
                           <a:solidFill>
                             <a:schemeClr val="bg1"/>
                           </a:solidFill>
@@ -10653,7 +10481,7 @@
                         <a:defRPr/>
                       </a:pPr>
                       <a:r>
-                        <a:rPr lang="en-US" sz="1800" dirty="0">
+                        <a:rPr lang="en-US" sz="1600" dirty="0">
                           <a:solidFill>
                             <a:schemeClr val="bg1"/>
                           </a:solidFill>
@@ -10687,7 +10515,7 @@
                         <a:defRPr/>
                       </a:pPr>
                       <a:r>
-                        <a:rPr lang="en-US" sz="1800" dirty="0">
+                        <a:rPr lang="en-US" sz="1600" dirty="0">
                           <a:solidFill>
                             <a:schemeClr val="bg1"/>
                           </a:solidFill>
@@ -10721,7 +10549,7 @@
                         <a:defRPr/>
                       </a:pPr>
                       <a:r>
-                        <a:rPr lang="en-US" sz="1800" dirty="0">
+                        <a:rPr lang="en-US" sz="1600" dirty="0">
                           <a:solidFill>
                             <a:schemeClr val="bg1"/>
                           </a:solidFill>
@@ -10755,7 +10583,7 @@
                         <a:defRPr/>
                       </a:pPr>
                       <a:r>
-                        <a:rPr lang="en-US" sz="1800" dirty="0">
+                        <a:rPr lang="en-US" sz="1600" dirty="0">
                           <a:solidFill>
                             <a:schemeClr val="bg1"/>
                           </a:solidFill>
@@ -10796,7 +10624,7 @@
                         <a:defRPr/>
                       </a:pPr>
                       <a:r>
-                        <a:rPr lang="en-US" sz="1800" dirty="0">
+                        <a:rPr lang="en-US" sz="1600" dirty="0">
                           <a:solidFill>
                             <a:schemeClr val="bg1"/>
                           </a:solidFill>
@@ -10804,14 +10632,14 @@
                         <a:t>Support Vector </a:t>
                       </a:r>
                       <a:r>
-                        <a:rPr lang="en-US" sz="1800" dirty="0" smtClean="0">
+                        <a:rPr lang="en-US" sz="1600" dirty="0" smtClean="0">
                           <a:solidFill>
                             <a:schemeClr val="bg1"/>
                           </a:solidFill>
                         </a:rPr>
                         <a:t>Machines (Scaled)</a:t>
                       </a:r>
-                      <a:endParaRPr lang="en-US" sz="1800" dirty="0">
+                      <a:endParaRPr lang="en-US" sz="1600" dirty="0">
                         <a:solidFill>
                           <a:schemeClr val="bg1"/>
                         </a:solidFill>
@@ -10826,7 +10654,7 @@
                     <a:lstStyle/>
                     <a:p>
                       <a:r>
-                        <a:rPr lang="en-US" dirty="0">
+                        <a:rPr lang="en-US" sz="1600" dirty="0">
                           <a:solidFill>
                             <a:schemeClr val="bg1"/>
                           </a:solidFill>
@@ -10843,7 +10671,7 @@
                     <a:lstStyle/>
                     <a:p>
                       <a:r>
-                        <a:rPr lang="en-US" dirty="0">
+                        <a:rPr lang="en-US" sz="1600" dirty="0">
                           <a:solidFill>
                             <a:schemeClr val="bg1"/>
                           </a:solidFill>
@@ -10853,7 +10681,7 @@
                     </a:p>
                     <a:p>
                       <a:r>
-                        <a:rPr lang="en-US" dirty="0">
+                        <a:rPr lang="en-US" sz="1600" dirty="0">
                           <a:solidFill>
                             <a:schemeClr val="bg1"/>
                           </a:solidFill>
@@ -10870,7 +10698,7 @@
                     <a:lstStyle/>
                     <a:p>
                       <a:r>
-                        <a:rPr lang="en-US" dirty="0">
+                        <a:rPr lang="en-US" sz="1600" dirty="0">
                           <a:solidFill>
                             <a:schemeClr val="bg1"/>
                           </a:solidFill>
@@ -10880,7 +10708,7 @@
                     </a:p>
                     <a:p>
                       <a:r>
-                        <a:rPr lang="en-US" dirty="0">
+                        <a:rPr lang="en-US" sz="1600" dirty="0">
                           <a:solidFill>
                             <a:schemeClr val="bg1"/>
                           </a:solidFill>
@@ -10897,7 +10725,7 @@
                     <a:lstStyle/>
                     <a:p>
                       <a:r>
-                        <a:rPr lang="en-US" dirty="0">
+                        <a:rPr lang="en-US" sz="1600" dirty="0">
                           <a:solidFill>
                             <a:schemeClr val="bg1"/>
                           </a:solidFill>
@@ -10907,7 +10735,7 @@
                     </a:p>
                     <a:p>
                       <a:r>
-                        <a:rPr lang="en-US" dirty="0">
+                        <a:rPr lang="en-US" sz="1600" dirty="0">
                           <a:solidFill>
                             <a:schemeClr val="bg1"/>
                           </a:solidFill>
@@ -10948,7 +10776,7 @@
                         <a:defRPr/>
                       </a:pPr>
                       <a:r>
-                        <a:rPr lang="en-US" sz="1800" dirty="0">
+                        <a:rPr lang="en-US" sz="1600" dirty="0">
                           <a:solidFill>
                             <a:schemeClr val="bg1"/>
                           </a:solidFill>
@@ -10965,7 +10793,7 @@
                     <a:lstStyle/>
                     <a:p>
                       <a:r>
-                        <a:rPr lang="en-US" dirty="0">
+                        <a:rPr lang="en-US" sz="1600" dirty="0">
                           <a:solidFill>
                             <a:schemeClr val="bg1"/>
                           </a:solidFill>
@@ -10982,7 +10810,7 @@
                     <a:lstStyle/>
                     <a:p>
                       <a:r>
-                        <a:rPr lang="en-US" dirty="0">
+                        <a:rPr lang="en-US" sz="1600" dirty="0">
                           <a:solidFill>
                             <a:schemeClr val="bg1"/>
                           </a:solidFill>
@@ -10992,7 +10820,7 @@
                     </a:p>
                     <a:p>
                       <a:r>
-                        <a:rPr lang="en-US" dirty="0">
+                        <a:rPr lang="en-US" sz="1600" dirty="0">
                           <a:solidFill>
                             <a:schemeClr val="bg1"/>
                           </a:solidFill>
@@ -11009,7 +10837,7 @@
                     <a:lstStyle/>
                     <a:p>
                       <a:r>
-                        <a:rPr lang="en-US" dirty="0">
+                        <a:rPr lang="en-US" sz="1600" dirty="0">
                           <a:solidFill>
                             <a:schemeClr val="bg1"/>
                           </a:solidFill>
@@ -11019,7 +10847,7 @@
                     </a:p>
                     <a:p>
                       <a:r>
-                        <a:rPr lang="en-US" dirty="0">
+                        <a:rPr lang="en-US" sz="1600" dirty="0">
                           <a:solidFill>
                             <a:schemeClr val="bg1"/>
                           </a:solidFill>
@@ -11036,7 +10864,7 @@
                     <a:lstStyle/>
                     <a:p>
                       <a:r>
-                        <a:rPr lang="en-US" dirty="0">
+                        <a:rPr lang="en-US" sz="1600" dirty="0">
                           <a:solidFill>
                             <a:schemeClr val="bg1"/>
                           </a:solidFill>
@@ -11046,7 +10874,7 @@
                     </a:p>
                     <a:p>
                       <a:r>
-                        <a:rPr lang="en-US" dirty="0">
+                        <a:rPr lang="en-US" sz="1600" dirty="0">
                           <a:solidFill>
                             <a:schemeClr val="bg1"/>
                           </a:solidFill>
@@ -11087,7 +10915,7 @@
                         <a:defRPr/>
                       </a:pPr>
                       <a:r>
-                        <a:rPr lang="en-US" sz="1800" dirty="0">
+                        <a:rPr lang="en-US" sz="1600" dirty="0">
                           <a:solidFill>
                             <a:schemeClr val="bg1"/>
                           </a:solidFill>
@@ -11104,7 +10932,7 @@
                     <a:lstStyle/>
                     <a:p>
                       <a:r>
-                        <a:rPr lang="en-US" dirty="0">
+                        <a:rPr lang="en-US" sz="1600" dirty="0">
                           <a:solidFill>
                             <a:schemeClr val="bg1"/>
                           </a:solidFill>
@@ -11121,7 +10949,7 @@
                     <a:lstStyle/>
                     <a:p>
                       <a:r>
-                        <a:rPr lang="en-US" dirty="0">
+                        <a:rPr lang="en-US" sz="1600" dirty="0">
                           <a:solidFill>
                             <a:schemeClr val="bg1"/>
                           </a:solidFill>
@@ -11131,7 +10959,7 @@
                     </a:p>
                     <a:p>
                       <a:r>
-                        <a:rPr lang="en-US" dirty="0">
+                        <a:rPr lang="en-US" sz="1600" dirty="0">
                           <a:solidFill>
                             <a:schemeClr val="bg1"/>
                           </a:solidFill>
@@ -11148,7 +10976,7 @@
                     <a:lstStyle/>
                     <a:p>
                       <a:r>
-                        <a:rPr lang="en-US" dirty="0">
+                        <a:rPr lang="en-US" sz="1600" dirty="0">
                           <a:solidFill>
                             <a:schemeClr val="bg1"/>
                           </a:solidFill>
@@ -11158,7 +10986,7 @@
                     </a:p>
                     <a:p>
                       <a:r>
-                        <a:rPr lang="en-US" dirty="0">
+                        <a:rPr lang="en-US" sz="1600" dirty="0">
                           <a:solidFill>
                             <a:schemeClr val="bg1"/>
                           </a:solidFill>
@@ -11175,7 +11003,7 @@
                     <a:lstStyle/>
                     <a:p>
                       <a:r>
-                        <a:rPr lang="en-US" dirty="0">
+                        <a:rPr lang="en-US" sz="1600" dirty="0">
                           <a:solidFill>
                             <a:schemeClr val="bg1"/>
                           </a:solidFill>
@@ -11185,7 +11013,7 @@
                     </a:p>
                     <a:p>
                       <a:r>
-                        <a:rPr lang="en-US" dirty="0">
+                        <a:rPr lang="en-US" sz="1600" dirty="0">
                           <a:solidFill>
                             <a:schemeClr val="bg1"/>
                           </a:solidFill>
@@ -11226,31 +11054,38 @@
                         <a:defRPr/>
                       </a:pPr>
                       <a:r>
-                        <a:rPr lang="en-US" sz="1800" dirty="0">
-                          <a:solidFill>
-                            <a:schemeClr val="bg1"/>
-                          </a:solidFill>
-                        </a:rPr>
-                        <a:t>Deep Learning</a:t>
-                      </a:r>
-                    </a:p>
-                  </a:txBody>
-                  <a:tcPr/>
-                </a:tc>
-                <a:tc>
-                  <a:txBody>
-                    <a:bodyPr/>
-                    <a:lstStyle/>
-                    <a:p>
-                      <a:r>
-                        <a:rPr lang="en-US" dirty="0" smtClean="0">
-                          <a:solidFill>
-                            <a:schemeClr val="bg1"/>
-                          </a:solidFill>
-                        </a:rPr>
-                        <a:t>0.74</a:t>
-                      </a:r>
-                      <a:endParaRPr lang="en-US" dirty="0">
+                        <a:rPr lang="en-US" sz="1600" dirty="0">
+                          <a:solidFill>
+                            <a:schemeClr val="bg1"/>
+                          </a:solidFill>
+                        </a:rPr>
+                        <a:t>Deep </a:t>
+                      </a:r>
+                      <a:r>
+                        <a:rPr lang="en-US" sz="1600" dirty="0" smtClean="0">
+                          <a:solidFill>
+                            <a:schemeClr val="bg1"/>
+                          </a:solidFill>
+                        </a:rPr>
+                        <a:t>Learning (</a:t>
+                      </a:r>
+                      <a:r>
+                        <a:rPr lang="en-US" sz="1600" dirty="0" err="1" smtClean="0">
+                          <a:solidFill>
+                            <a:schemeClr val="bg1"/>
+                          </a:solidFill>
+                        </a:rPr>
+                        <a:t>Tensorflow</a:t>
+                      </a:r>
+                      <a:r>
+                        <a:rPr lang="en-US" sz="1600" dirty="0" smtClean="0">
+                          <a:solidFill>
+                            <a:schemeClr val="bg1"/>
+                          </a:solidFill>
+                        </a:rPr>
+                        <a:t>)</a:t>
+                      </a:r>
+                      <a:endParaRPr lang="en-US" sz="1600" dirty="0">
                         <a:solidFill>
                           <a:schemeClr val="bg1"/>
                         </a:solidFill>
@@ -11265,14 +11100,14 @@
                     <a:lstStyle/>
                     <a:p>
                       <a:r>
-                        <a:rPr lang="en-US" dirty="0" smtClean="0">
-                          <a:solidFill>
-                            <a:schemeClr val="bg1"/>
-                          </a:solidFill>
-                        </a:rPr>
-                        <a:t>NA</a:t>
-                      </a:r>
-                      <a:endParaRPr lang="en-US" dirty="0">
+                        <a:rPr lang="en-US" sz="1600" dirty="0" smtClean="0">
+                          <a:solidFill>
+                            <a:schemeClr val="bg1"/>
+                          </a:solidFill>
+                        </a:rPr>
+                        <a:t>0.74</a:t>
+                      </a:r>
+                      <a:endParaRPr lang="en-US" sz="1600" dirty="0">
                         <a:solidFill>
                           <a:schemeClr val="bg1"/>
                         </a:solidFill>
@@ -11287,14 +11122,14 @@
                     <a:lstStyle/>
                     <a:p>
                       <a:r>
-                        <a:rPr lang="en-US" dirty="0" smtClean="0">
+                        <a:rPr lang="en-US" sz="1600" dirty="0" smtClean="0">
                           <a:solidFill>
                             <a:schemeClr val="bg1"/>
                           </a:solidFill>
                         </a:rPr>
                         <a:t>NA</a:t>
                       </a:r>
-                      <a:endParaRPr lang="en-US" dirty="0">
+                      <a:endParaRPr lang="en-US" sz="1600" dirty="0">
                         <a:solidFill>
                           <a:schemeClr val="bg1"/>
                         </a:solidFill>
@@ -11309,14 +11144,36 @@
                     <a:lstStyle/>
                     <a:p>
                       <a:r>
-                        <a:rPr lang="en-US" dirty="0" smtClean="0">
+                        <a:rPr lang="en-US" sz="1600" dirty="0" smtClean="0">
                           <a:solidFill>
                             <a:schemeClr val="bg1"/>
                           </a:solidFill>
                         </a:rPr>
                         <a:t>NA</a:t>
                       </a:r>
-                      <a:endParaRPr lang="en-US" dirty="0">
+                      <a:endParaRPr lang="en-US" sz="1600" dirty="0">
+                        <a:solidFill>
+                          <a:schemeClr val="bg1"/>
+                        </a:solidFill>
+                      </a:endParaRPr>
+                    </a:p>
+                  </a:txBody>
+                  <a:tcPr/>
+                </a:tc>
+                <a:tc>
+                  <a:txBody>
+                    <a:bodyPr/>
+                    <a:lstStyle/>
+                    <a:p>
+                      <a:r>
+                        <a:rPr lang="en-US" sz="1600" dirty="0" smtClean="0">
+                          <a:solidFill>
+                            <a:schemeClr val="bg1"/>
+                          </a:solidFill>
+                        </a:rPr>
+                        <a:t>NA</a:t>
+                      </a:r>
+                      <a:endParaRPr lang="en-US" sz="1600" dirty="0">
                         <a:solidFill>
                           <a:schemeClr val="bg1"/>
                         </a:solidFill>
@@ -11355,7 +11212,7 @@
                         <a:defRPr/>
                       </a:pPr>
                       <a:r>
-                        <a:rPr lang="en-US" sz="1800" dirty="0">
+                        <a:rPr lang="en-US" sz="1600" dirty="0">
                           <a:solidFill>
                             <a:schemeClr val="bg1"/>
                           </a:solidFill>
@@ -11363,14 +11220,14 @@
                         <a:t>K-Nearest </a:t>
                       </a:r>
                       <a:r>
-                        <a:rPr lang="en-US" sz="1800" dirty="0" smtClean="0">
+                        <a:rPr lang="en-US" sz="1600" dirty="0" smtClean="0">
                           <a:solidFill>
                             <a:schemeClr val="bg1"/>
                           </a:solidFill>
                         </a:rPr>
                         <a:t>Neighbors (Scaled)</a:t>
                       </a:r>
-                      <a:endParaRPr lang="en-US" sz="1800" dirty="0">
+                      <a:endParaRPr lang="en-US" sz="1600" dirty="0">
                         <a:solidFill>
                           <a:schemeClr val="bg1"/>
                         </a:solidFill>
@@ -11385,14 +11242,14 @@
                     <a:lstStyle/>
                     <a:p>
                       <a:r>
-                        <a:rPr lang="en-US" dirty="0" smtClean="0">
+                        <a:rPr lang="en-US" sz="1600" dirty="0" smtClean="0">
                           <a:solidFill>
                             <a:schemeClr val="bg1"/>
                           </a:solidFill>
                         </a:rPr>
                         <a:t>0.72</a:t>
                       </a:r>
-                      <a:endParaRPr lang="en-US" dirty="0">
+                      <a:endParaRPr lang="en-US" sz="1600" dirty="0">
                         <a:solidFill>
                           <a:schemeClr val="bg1"/>
                         </a:solidFill>
@@ -11407,7 +11264,7 @@
                     <a:lstStyle/>
                     <a:p>
                       <a:r>
-                        <a:rPr lang="en-US" dirty="0">
+                        <a:rPr lang="en-US" sz="1600" dirty="0">
                           <a:solidFill>
                             <a:schemeClr val="bg1"/>
                           </a:solidFill>
@@ -11415,14 +11272,14 @@
                         <a:t>Blue: </a:t>
                       </a:r>
                       <a:r>
-                        <a:rPr lang="en-US" dirty="0" smtClean="0">
+                        <a:rPr lang="en-US" sz="1600" dirty="0" smtClean="0">
                           <a:solidFill>
                             <a:schemeClr val="bg1"/>
                           </a:solidFill>
                         </a:rPr>
                         <a:t>0.69</a:t>
                       </a:r>
-                      <a:endParaRPr lang="en-US" dirty="0">
+                      <a:endParaRPr lang="en-US" sz="1600" dirty="0">
                         <a:solidFill>
                           <a:schemeClr val="bg1"/>
                         </a:solidFill>
@@ -11430,7 +11287,7 @@
                     </a:p>
                     <a:p>
                       <a:r>
-                        <a:rPr lang="en-US" dirty="0">
+                        <a:rPr lang="en-US" sz="1600" dirty="0">
                           <a:solidFill>
                             <a:schemeClr val="bg1"/>
                           </a:solidFill>
@@ -11438,14 +11295,14 @@
                         <a:t>Red: </a:t>
                       </a:r>
                       <a:r>
-                        <a:rPr lang="en-US" dirty="0" smtClean="0">
+                        <a:rPr lang="en-US" sz="1600" dirty="0" smtClean="0">
                           <a:solidFill>
                             <a:schemeClr val="bg1"/>
                           </a:solidFill>
                         </a:rPr>
                         <a:t>0.74</a:t>
                       </a:r>
-                      <a:endParaRPr lang="en-US" dirty="0">
+                      <a:endParaRPr lang="en-US" sz="1600" dirty="0">
                         <a:solidFill>
                           <a:schemeClr val="bg1"/>
                         </a:solidFill>
@@ -11460,7 +11317,7 @@
                     <a:lstStyle/>
                     <a:p>
                       <a:r>
-                        <a:rPr lang="en-US" dirty="0">
+                        <a:rPr lang="en-US" sz="1600" dirty="0">
                           <a:solidFill>
                             <a:schemeClr val="bg1"/>
                           </a:solidFill>
@@ -11468,14 +11325,14 @@
                         <a:t>Blue: </a:t>
                       </a:r>
                       <a:r>
-                        <a:rPr lang="en-US" dirty="0" smtClean="0">
+                        <a:rPr lang="en-US" sz="1600" dirty="0" smtClean="0">
                           <a:solidFill>
                             <a:schemeClr val="bg1"/>
                           </a:solidFill>
                         </a:rPr>
                         <a:t>0.58</a:t>
                       </a:r>
-                      <a:endParaRPr lang="en-US" dirty="0">
+                      <a:endParaRPr lang="en-US" sz="1600" dirty="0">
                         <a:solidFill>
                           <a:schemeClr val="bg1"/>
                         </a:solidFill>
@@ -11483,7 +11340,7 @@
                     </a:p>
                     <a:p>
                       <a:r>
-                        <a:rPr lang="en-US" dirty="0">
+                        <a:rPr lang="en-US" sz="1600" dirty="0">
                           <a:solidFill>
                             <a:schemeClr val="bg1"/>
                           </a:solidFill>
@@ -11491,14 +11348,14 @@
                         <a:t>Red: </a:t>
                       </a:r>
                       <a:r>
-                        <a:rPr lang="en-US" dirty="0" smtClean="0">
+                        <a:rPr lang="en-US" sz="1600" dirty="0" smtClean="0">
                           <a:solidFill>
                             <a:schemeClr val="bg1"/>
                           </a:solidFill>
                         </a:rPr>
                         <a:t>0.81</a:t>
                       </a:r>
-                      <a:endParaRPr lang="en-US" dirty="0">
+                      <a:endParaRPr lang="en-US" sz="1600" dirty="0">
                         <a:solidFill>
                           <a:schemeClr val="bg1"/>
                         </a:solidFill>
@@ -11513,7 +11370,7 @@
                     <a:lstStyle/>
                     <a:p>
                       <a:r>
-                        <a:rPr lang="en-US" dirty="0">
+                        <a:rPr lang="en-US" sz="1600" dirty="0">
                           <a:solidFill>
                             <a:schemeClr val="bg1"/>
                           </a:solidFill>
@@ -11521,14 +11378,14 @@
                         <a:t>Blue: </a:t>
                       </a:r>
                       <a:r>
-                        <a:rPr lang="en-US" dirty="0" smtClean="0">
+                        <a:rPr lang="en-US" sz="1600" dirty="0" smtClean="0">
                           <a:solidFill>
                             <a:schemeClr val="bg1"/>
                           </a:solidFill>
                         </a:rPr>
                         <a:t>0.63</a:t>
                       </a:r>
-                      <a:endParaRPr lang="en-US" dirty="0">
+                      <a:endParaRPr lang="en-US" sz="1600" dirty="0">
                         <a:solidFill>
                           <a:schemeClr val="bg1"/>
                         </a:solidFill>
@@ -11536,7 +11393,7 @@
                     </a:p>
                     <a:p>
                       <a:r>
-                        <a:rPr lang="en-US" dirty="0">
+                        <a:rPr lang="en-US" sz="1600" dirty="0">
                           <a:solidFill>
                             <a:schemeClr val="bg1"/>
                           </a:solidFill>
@@ -11544,14 +11401,14 @@
                         <a:t>Red: </a:t>
                       </a:r>
                       <a:r>
-                        <a:rPr lang="en-US" dirty="0" smtClean="0">
+                        <a:rPr lang="en-US" sz="1600" dirty="0" smtClean="0">
                           <a:solidFill>
                             <a:schemeClr val="bg1"/>
                           </a:solidFill>
                         </a:rPr>
                         <a:t>0.77</a:t>
                       </a:r>
-                      <a:endParaRPr lang="en-US" dirty="0">
+                      <a:endParaRPr lang="en-US" sz="1600" dirty="0">
                         <a:solidFill>
                           <a:schemeClr val="bg1"/>
                         </a:solidFill>
@@ -11590,7 +11447,7 @@
                         <a:defRPr/>
                       </a:pPr>
                       <a:r>
-                        <a:rPr lang="en-US" sz="1800" dirty="0">
+                        <a:rPr lang="en-US" sz="1600" dirty="0">
                           <a:solidFill>
                             <a:schemeClr val="bg1"/>
                           </a:solidFill>
@@ -11598,14 +11455,22 @@
                         <a:t>Neural </a:t>
                       </a:r>
                       <a:r>
-                        <a:rPr lang="en-US" sz="1800" dirty="0" smtClean="0">
-                          <a:solidFill>
-                            <a:schemeClr val="bg1"/>
-                          </a:solidFill>
-                        </a:rPr>
-                        <a:t>Networks (Scaled)</a:t>
-                      </a:r>
-                      <a:endParaRPr lang="en-US" sz="1800" dirty="0">
+                        <a:rPr lang="en-US" sz="1600" dirty="0" smtClean="0">
+                          <a:solidFill>
+                            <a:schemeClr val="bg1"/>
+                          </a:solidFill>
+                        </a:rPr>
+                        <a:t>Networks MLP </a:t>
+                      </a:r>
+                      <a:r>
+                        <a:rPr lang="en-US" sz="1600" dirty="0" smtClean="0">
+                          <a:solidFill>
+                            <a:schemeClr val="bg1"/>
+                          </a:solidFill>
+                        </a:rPr>
+                        <a:t>(Scaled)</a:t>
+                      </a:r>
+                      <a:endParaRPr lang="en-US" sz="1600" dirty="0">
                         <a:solidFill>
                           <a:schemeClr val="bg1"/>
                         </a:solidFill>
@@ -11620,14 +11485,14 @@
                     <a:lstStyle/>
                     <a:p>
                       <a:r>
-                        <a:rPr lang="en-US" dirty="0" smtClean="0">
+                        <a:rPr lang="en-US" sz="1600" dirty="0" smtClean="0">
                           <a:solidFill>
                             <a:schemeClr val="bg1"/>
                           </a:solidFill>
                         </a:rPr>
                         <a:t>0.72</a:t>
                       </a:r>
-                      <a:endParaRPr lang="en-US" dirty="0">
+                      <a:endParaRPr lang="en-US" sz="1600" dirty="0">
                         <a:solidFill>
                           <a:schemeClr val="bg1"/>
                         </a:solidFill>
@@ -11642,7 +11507,7 @@
                     <a:lstStyle/>
                     <a:p>
                       <a:r>
-                        <a:rPr lang="en-US" dirty="0">
+                        <a:rPr lang="en-US" sz="1600" dirty="0">
                           <a:solidFill>
                             <a:schemeClr val="bg1"/>
                           </a:solidFill>
@@ -11650,14 +11515,14 @@
                         <a:t>Blue: </a:t>
                       </a:r>
                       <a:r>
-                        <a:rPr lang="en-US" dirty="0" smtClean="0">
+                        <a:rPr lang="en-US" sz="1600" dirty="0" smtClean="0">
                           <a:solidFill>
                             <a:schemeClr val="bg1"/>
                           </a:solidFill>
                         </a:rPr>
                         <a:t>0.65</a:t>
                       </a:r>
-                      <a:endParaRPr lang="en-US" dirty="0">
+                      <a:endParaRPr lang="en-US" sz="1600" dirty="0">
                         <a:solidFill>
                           <a:schemeClr val="bg1"/>
                         </a:solidFill>
@@ -11665,7 +11530,7 @@
                     </a:p>
                     <a:p>
                       <a:r>
-                        <a:rPr lang="en-US" dirty="0">
+                        <a:rPr lang="en-US" sz="1600" dirty="0">
                           <a:solidFill>
                             <a:schemeClr val="bg1"/>
                           </a:solidFill>
@@ -11673,14 +11538,14 @@
                         <a:t>Red: </a:t>
                       </a:r>
                       <a:r>
-                        <a:rPr lang="en-US" dirty="0" smtClean="0">
+                        <a:rPr lang="en-US" sz="1600" dirty="0" smtClean="0">
                           <a:solidFill>
                             <a:schemeClr val="bg1"/>
                           </a:solidFill>
                         </a:rPr>
                         <a:t>0.77</a:t>
                       </a:r>
-                      <a:endParaRPr lang="en-US" dirty="0">
+                      <a:endParaRPr lang="en-US" sz="1600" dirty="0">
                         <a:solidFill>
                           <a:schemeClr val="bg1"/>
                         </a:solidFill>
@@ -11695,7 +11560,7 @@
                     <a:lstStyle/>
                     <a:p>
                       <a:r>
-                        <a:rPr lang="en-US" dirty="0">
+                        <a:rPr lang="en-US" sz="1600" dirty="0">
                           <a:solidFill>
                             <a:schemeClr val="bg1"/>
                           </a:solidFill>
@@ -11703,14 +11568,14 @@
                         <a:t>Blue: </a:t>
                       </a:r>
                       <a:r>
-                        <a:rPr lang="en-US" dirty="0" smtClean="0">
+                        <a:rPr lang="en-US" sz="1600" dirty="0" smtClean="0">
                           <a:solidFill>
                             <a:schemeClr val="bg1"/>
                           </a:solidFill>
                         </a:rPr>
                         <a:t>0.69</a:t>
                       </a:r>
-                      <a:endParaRPr lang="en-US" dirty="0">
+                      <a:endParaRPr lang="en-US" sz="1600" dirty="0">
                         <a:solidFill>
                           <a:schemeClr val="bg1"/>
                         </a:solidFill>
@@ -11718,7 +11583,7 @@
                     </a:p>
                     <a:p>
                       <a:r>
-                        <a:rPr lang="en-US" dirty="0">
+                        <a:rPr lang="en-US" sz="1600" dirty="0">
                           <a:solidFill>
                             <a:schemeClr val="bg1"/>
                           </a:solidFill>
@@ -11726,14 +11591,14 @@
                         <a:t>Red: </a:t>
                       </a:r>
                       <a:r>
-                        <a:rPr lang="en-US" dirty="0" smtClean="0">
+                        <a:rPr lang="en-US" sz="1600" dirty="0" smtClean="0">
                           <a:solidFill>
                             <a:schemeClr val="bg1"/>
                           </a:solidFill>
                         </a:rPr>
                         <a:t>0.74</a:t>
                       </a:r>
-                      <a:endParaRPr lang="en-US" dirty="0">
+                      <a:endParaRPr lang="en-US" sz="1600" dirty="0">
                         <a:solidFill>
                           <a:schemeClr val="bg1"/>
                         </a:solidFill>
@@ -11748,7 +11613,7 @@
                     <a:lstStyle/>
                     <a:p>
                       <a:r>
-                        <a:rPr lang="en-US" dirty="0">
+                        <a:rPr lang="en-US" sz="1600" dirty="0">
                           <a:solidFill>
                             <a:schemeClr val="bg1"/>
                           </a:solidFill>
@@ -11756,14 +11621,14 @@
                         <a:t>Blue: </a:t>
                       </a:r>
                       <a:r>
-                        <a:rPr lang="en-US" dirty="0" smtClean="0">
+                        <a:rPr lang="en-US" sz="1600" dirty="0" smtClean="0">
                           <a:solidFill>
                             <a:schemeClr val="bg1"/>
                           </a:solidFill>
                         </a:rPr>
                         <a:t>0.67</a:t>
                       </a:r>
-                      <a:endParaRPr lang="en-US" dirty="0">
+                      <a:endParaRPr lang="en-US" sz="1600" dirty="0">
                         <a:solidFill>
                           <a:schemeClr val="bg1"/>
                         </a:solidFill>
@@ -11771,7 +11636,7 @@
                     </a:p>
                     <a:p>
                       <a:r>
-                        <a:rPr lang="en-US" dirty="0">
+                        <a:rPr lang="en-US" sz="1600" dirty="0">
                           <a:solidFill>
                             <a:schemeClr val="bg1"/>
                           </a:solidFill>
@@ -11779,14 +11644,14 @@
                         <a:t>Red: </a:t>
                       </a:r>
                       <a:r>
-                        <a:rPr lang="en-US" dirty="0" smtClean="0">
+                        <a:rPr lang="en-US" sz="1600" dirty="0" smtClean="0">
                           <a:solidFill>
                             <a:schemeClr val="bg1"/>
                           </a:solidFill>
                         </a:rPr>
                         <a:t>0.76</a:t>
                       </a:r>
-                      <a:endParaRPr lang="en-US" dirty="0">
+                      <a:endParaRPr lang="en-US" sz="1600" dirty="0">
                         <a:solidFill>
                           <a:schemeClr val="bg1"/>
                         </a:solidFill>
@@ -14351,12 +14216,6 @@
               </a:rPr>
               <a:t>&amp; Feature Extraction</a:t>
             </a:r>
-            <a:endParaRPr lang="en-US" b="1" dirty="0">
-              <a:solidFill>
-                <a:schemeClr val="bg1"/>
-              </a:solidFill>
-              <a:latin typeface="Sternbach" panose="02000500000000000000" pitchFamily="2" charset="0"/>
-            </a:endParaRPr>
           </a:p>
         </p:txBody>
       </p:sp>

</xml_diff>